<commit_message>
2° versao do documento com aa
</commit_message>
<xml_diff>
--- a/PastaDocumentos/KickoffChallenge.pptx
+++ b/PastaDocumentos/KickoffChallenge.pptx
@@ -104,6 +104,11 @@
       </a:defRPr>
     </a:lvl9pPr>
   </p:defaultTextStyle>
+  <p:extLst>
+    <p:ext uri="{EFAFB233-063F-42B5-8137-9DF3F51BA10A}">
+      <p15:sldGuideLst xmlns:p15="http://schemas.microsoft.com/office/powerpoint/2012/main"/>
+    </p:ext>
+  </p:extLst>
 </p:presentation>
 </file>
 
@@ -3344,7 +3349,15 @@
           <a:p>
             <a:r>
               <a:rPr lang="pt-BR" dirty="0"/>
-              <a:t>Documento de abertura de projeto</a:t>
+              <a:t>Documento de </a:t>
+            </a:r>
+            <a:r>
+              <a:rPr lang="pt-BR"/>
+              <a:t>aabertura</a:t>
+            </a:r>
+            <a:r>
+              <a:rPr lang="pt-BR" dirty="0"/>
+              <a:t> de projeto</a:t>
             </a:r>
             <a:endParaRPr lang="en-US" dirty="0"/>
           </a:p>

</xml_diff>